<commit_message>
fix change buffer wrong desc
</commit_message>
<xml_diff>
--- a/MySQL实战/09普通索引和唯一索引，应该怎么选择？.pptx
+++ b/MySQL实战/09普通索引和唯一索引，应该怎么选择？.pptx
@@ -205,7 +205,7 @@
           <a:p>
             <a:fld id="{A900F2CD-AD8F-46FC-AAAB-A0D218D6826F}" type="datetimeFigureOut">
               <a:rPr lang="zh-CN" altLang="en-US" smtClean="0"/>
-              <a:t>2020/1/19</a:t>
+              <a:t>2020/3/26</a:t>
             </a:fld>
             <a:endParaRPr lang="zh-CN" altLang="en-US"/>
           </a:p>
@@ -659,7 +659,7 @@
           <a:p>
             <a:fld id="{E396512D-F96B-4538-B91A-F7EB57A489A0}" type="datetimeFigureOut">
               <a:rPr lang="zh-CN" altLang="en-US" smtClean="0"/>
-              <a:t>2020/1/19</a:t>
+              <a:t>2020/3/26</a:t>
             </a:fld>
             <a:endParaRPr lang="zh-CN" altLang="en-US"/>
           </a:p>
@@ -934,7 +934,7 @@
           <a:p>
             <a:fld id="{E396512D-F96B-4538-B91A-F7EB57A489A0}" type="datetimeFigureOut">
               <a:rPr lang="zh-CN" altLang="en-US" smtClean="0"/>
-              <a:t>2020/1/19</a:t>
+              <a:t>2020/3/26</a:t>
             </a:fld>
             <a:endParaRPr lang="zh-CN" altLang="en-US"/>
           </a:p>
@@ -1128,7 +1128,7 @@
           <a:p>
             <a:fld id="{E396512D-F96B-4538-B91A-F7EB57A489A0}" type="datetimeFigureOut">
               <a:rPr lang="zh-CN" altLang="en-US" smtClean="0"/>
-              <a:t>2020/1/19</a:t>
+              <a:t>2020/3/26</a:t>
             </a:fld>
             <a:endParaRPr lang="zh-CN" altLang="en-US"/>
           </a:p>
@@ -1401,7 +1401,7 @@
           <a:p>
             <a:fld id="{E396512D-F96B-4538-B91A-F7EB57A489A0}" type="datetimeFigureOut">
               <a:rPr lang="zh-CN" altLang="en-US" smtClean="0"/>
-              <a:t>2020/1/19</a:t>
+              <a:t>2020/3/26</a:t>
             </a:fld>
             <a:endParaRPr lang="zh-CN" altLang="en-US"/>
           </a:p>
@@ -1742,7 +1742,7 @@
           <a:p>
             <a:fld id="{E396512D-F96B-4538-B91A-F7EB57A489A0}" type="datetimeFigureOut">
               <a:rPr lang="zh-CN" altLang="en-US" smtClean="0"/>
-              <a:t>2020/1/19</a:t>
+              <a:t>2020/3/26</a:t>
             </a:fld>
             <a:endParaRPr lang="zh-CN" altLang="en-US"/>
           </a:p>
@@ -2365,7 +2365,7 @@
           <a:p>
             <a:fld id="{E396512D-F96B-4538-B91A-F7EB57A489A0}" type="datetimeFigureOut">
               <a:rPr lang="zh-CN" altLang="en-US" smtClean="0"/>
-              <a:t>2020/1/19</a:t>
+              <a:t>2020/3/26</a:t>
             </a:fld>
             <a:endParaRPr lang="zh-CN" altLang="en-US"/>
           </a:p>
@@ -3225,7 +3225,7 @@
           <a:p>
             <a:fld id="{E396512D-F96B-4538-B91A-F7EB57A489A0}" type="datetimeFigureOut">
               <a:rPr lang="zh-CN" altLang="en-US" smtClean="0"/>
-              <a:t>2020/1/19</a:t>
+              <a:t>2020/3/26</a:t>
             </a:fld>
             <a:endParaRPr lang="zh-CN" altLang="en-US"/>
           </a:p>
@@ -3395,7 +3395,7 @@
           <a:p>
             <a:fld id="{E396512D-F96B-4538-B91A-F7EB57A489A0}" type="datetimeFigureOut">
               <a:rPr lang="zh-CN" altLang="en-US" smtClean="0"/>
-              <a:t>2020/1/19</a:t>
+              <a:t>2020/3/26</a:t>
             </a:fld>
             <a:endParaRPr lang="zh-CN" altLang="en-US"/>
           </a:p>
@@ -3575,7 +3575,7 @@
           <a:p>
             <a:fld id="{E396512D-F96B-4538-B91A-F7EB57A489A0}" type="datetimeFigureOut">
               <a:rPr lang="zh-CN" altLang="en-US" smtClean="0"/>
-              <a:t>2020/1/19</a:t>
+              <a:t>2020/3/26</a:t>
             </a:fld>
             <a:endParaRPr lang="zh-CN" altLang="en-US"/>
           </a:p>
@@ -3745,7 +3745,7 @@
           <a:p>
             <a:fld id="{E396512D-F96B-4538-B91A-F7EB57A489A0}" type="datetimeFigureOut">
               <a:rPr lang="zh-CN" altLang="en-US" smtClean="0"/>
-              <a:t>2020/1/19</a:t>
+              <a:t>2020/3/26</a:t>
             </a:fld>
             <a:endParaRPr lang="zh-CN" altLang="en-US"/>
           </a:p>
@@ -3992,7 +3992,7 @@
           <a:p>
             <a:fld id="{E396512D-F96B-4538-B91A-F7EB57A489A0}" type="datetimeFigureOut">
               <a:rPr lang="zh-CN" altLang="en-US" smtClean="0"/>
-              <a:t>2020/1/19</a:t>
+              <a:t>2020/3/26</a:t>
             </a:fld>
             <a:endParaRPr lang="zh-CN" altLang="en-US"/>
           </a:p>
@@ -4284,7 +4284,7 @@
           <a:p>
             <a:fld id="{E396512D-F96B-4538-B91A-F7EB57A489A0}" type="datetimeFigureOut">
               <a:rPr lang="zh-CN" altLang="en-US" smtClean="0"/>
-              <a:t>2020/1/19</a:t>
+              <a:t>2020/3/26</a:t>
             </a:fld>
             <a:endParaRPr lang="zh-CN" altLang="en-US"/>
           </a:p>
@@ -4728,7 +4728,7 @@
           <a:p>
             <a:fld id="{E396512D-F96B-4538-B91A-F7EB57A489A0}" type="datetimeFigureOut">
               <a:rPr lang="zh-CN" altLang="en-US" smtClean="0"/>
-              <a:t>2020/1/19</a:t>
+              <a:t>2020/3/26</a:t>
             </a:fld>
             <a:endParaRPr lang="zh-CN" altLang="en-US"/>
           </a:p>
@@ -4846,7 +4846,7 @@
           <a:p>
             <a:fld id="{E396512D-F96B-4538-B91A-F7EB57A489A0}" type="datetimeFigureOut">
               <a:rPr lang="zh-CN" altLang="en-US" smtClean="0"/>
-              <a:t>2020/1/19</a:t>
+              <a:t>2020/3/26</a:t>
             </a:fld>
             <a:endParaRPr lang="zh-CN" altLang="en-US"/>
           </a:p>
@@ -4941,7 +4941,7 @@
           <a:p>
             <a:fld id="{E396512D-F96B-4538-B91A-F7EB57A489A0}" type="datetimeFigureOut">
               <a:rPr lang="zh-CN" altLang="en-US" smtClean="0"/>
-              <a:t>2020/1/19</a:t>
+              <a:t>2020/3/26</a:t>
             </a:fld>
             <a:endParaRPr lang="zh-CN" altLang="en-US"/>
           </a:p>
@@ -5220,7 +5220,7 @@
           <a:p>
             <a:fld id="{E396512D-F96B-4538-B91A-F7EB57A489A0}" type="datetimeFigureOut">
               <a:rPr lang="zh-CN" altLang="en-US" smtClean="0"/>
-              <a:t>2020/1/19</a:t>
+              <a:t>2020/3/26</a:t>
             </a:fld>
             <a:endParaRPr lang="zh-CN" altLang="en-US"/>
           </a:p>
@@ -5495,7 +5495,7 @@
           <a:p>
             <a:fld id="{E396512D-F96B-4538-B91A-F7EB57A489A0}" type="datetimeFigureOut">
               <a:rPr lang="zh-CN" altLang="en-US" smtClean="0"/>
-              <a:t>2020/1/19</a:t>
+              <a:t>2020/3/26</a:t>
             </a:fld>
             <a:endParaRPr lang="zh-CN" altLang="en-US"/>
           </a:p>
@@ -5924,7 +5924,7 @@
           <a:p>
             <a:fld id="{E396512D-F96B-4538-B91A-F7EB57A489A0}" type="datetimeFigureOut">
               <a:rPr lang="zh-CN" altLang="en-US" smtClean="0"/>
-              <a:t>2020/1/19</a:t>
+              <a:t>2020/3/26</a:t>
             </a:fld>
             <a:endParaRPr lang="zh-CN" altLang="en-US"/>
           </a:p>
@@ -8887,8 +8887,8 @@
         </p:nvSpPr>
         <p:spPr>
           <a:xfrm>
-            <a:off x="1884797" y="2344717"/>
-            <a:ext cx="3276594" cy="2970234"/>
+            <a:off x="1908265" y="2344716"/>
+            <a:ext cx="3276594" cy="4398983"/>
           </a:xfrm>
           <a:prstGeom prst="roundRect">
             <a:avLst/>
@@ -9158,8 +9158,8 @@
         </p:nvSpPr>
         <p:spPr>
           <a:xfrm>
-            <a:off x="2273300" y="2603500"/>
-            <a:ext cx="2546525" cy="1922780"/>
+            <a:off x="2273300" y="2674460"/>
+            <a:ext cx="2546525" cy="1471885"/>
           </a:xfrm>
           <a:prstGeom prst="roundRect">
             <a:avLst/>
@@ -9257,7 +9257,7 @@
         <p:spPr>
           <a:xfrm>
             <a:off x="2419175" y="2660579"/>
-            <a:ext cx="2381425" cy="584775"/>
+            <a:ext cx="2381425" cy="338554"/>
           </a:xfrm>
           <a:prstGeom prst="rect">
             <a:avLst/>
@@ -9270,41 +9270,11 @@
           <a:lstStyle/>
           <a:p>
             <a:r>
-              <a:rPr lang="zh-CN" altLang="en-US" sz="1600" dirty="0" smtClean="0">
-                <a:latin typeface="微软雅黑" panose="020B0503020204020204" pitchFamily="34" charset="-122"/>
-                <a:ea typeface="微软雅黑" panose="020B0503020204020204" pitchFamily="34" charset="-122"/>
-              </a:rPr>
-              <a:t>内存中的</a:t>
-            </a:r>
-            <a:r>
               <a:rPr lang="en-US" altLang="zh-CN" sz="1600" dirty="0" smtClean="0">
                 <a:latin typeface="微软雅黑" panose="020B0503020204020204" pitchFamily="34" charset="-122"/>
                 <a:ea typeface="微软雅黑" panose="020B0503020204020204" pitchFamily="34" charset="-122"/>
               </a:rPr>
               <a:t>change buffer</a:t>
-            </a:r>
-          </a:p>
-          <a:p>
-            <a:r>
-              <a:rPr lang="zh-CN" altLang="en-US" sz="1600" dirty="0" smtClean="0">
-                <a:latin typeface="微软雅黑" panose="020B0503020204020204" pitchFamily="34" charset="-122"/>
-                <a:ea typeface="微软雅黑" panose="020B0503020204020204" pitchFamily="34" charset="-122"/>
-              </a:rPr>
-              <a:t>被</a:t>
-            </a:r>
-            <a:r>
-              <a:rPr lang="en-US" altLang="zh-CN" sz="1600" dirty="0" smtClean="0">
-                <a:latin typeface="微软雅黑" panose="020B0503020204020204" pitchFamily="34" charset="-122"/>
-                <a:ea typeface="微软雅黑" panose="020B0503020204020204" pitchFamily="34" charset="-122"/>
-              </a:rPr>
-              <a:t>buffer pool</a:t>
-            </a:r>
-            <a:r>
-              <a:rPr lang="zh-CN" altLang="en-US" sz="1600" dirty="0" smtClean="0">
-                <a:latin typeface="微软雅黑" panose="020B0503020204020204" pitchFamily="34" charset="-122"/>
-                <a:ea typeface="微软雅黑" panose="020B0503020204020204" pitchFamily="34" charset="-122"/>
-              </a:rPr>
-              <a:t>管理</a:t>
             </a:r>
             <a:endParaRPr lang="zh-CN" altLang="en-US" sz="1600" dirty="0">
               <a:latin typeface="微软雅黑" panose="020B0503020204020204" pitchFamily="34" charset="-122"/>
@@ -9406,8 +9376,8 @@
         </p:nvSpPr>
         <p:spPr>
           <a:xfrm>
-            <a:off x="1020958" y="3356724"/>
-            <a:ext cx="1184940" cy="292388"/>
+            <a:off x="980280" y="2963672"/>
+            <a:ext cx="1305864" cy="707886"/>
           </a:xfrm>
           <a:prstGeom prst="rect">
             <a:avLst/>
@@ -9415,26 +9385,47 @@
           <a:noFill/>
         </p:spPr>
         <p:txBody>
-          <a:bodyPr wrap="none" rtlCol="0">
+          <a:bodyPr wrap="square" rtlCol="0">
             <a:spAutoFit/>
           </a:bodyPr>
           <a:lstStyle/>
           <a:p>
             <a:r>
-              <a:rPr lang="zh-CN" altLang="en-US" sz="1300" dirty="0">
-                <a:latin typeface="微软雅黑" panose="020B0503020204020204" pitchFamily="34" charset="-122"/>
-                <a:ea typeface="微软雅黑" panose="020B0503020204020204" pitchFamily="34" charset="-122"/>
-              </a:rPr>
-              <a:t>先放</a:t>
-            </a:r>
-            <a:r>
-              <a:rPr lang="zh-CN" altLang="en-US" sz="1300" dirty="0" smtClean="0">
-                <a:latin typeface="微软雅黑" panose="020B0503020204020204" pitchFamily="34" charset="-122"/>
-                <a:ea typeface="微软雅黑" panose="020B0503020204020204" pitchFamily="34" charset="-122"/>
-              </a:rPr>
-              <a:t>入内存中</a:t>
-            </a:r>
-            <a:endParaRPr lang="zh-CN" altLang="en-US" sz="1300" dirty="0">
+              <a:rPr lang="zh-CN" altLang="en-US" sz="1000" dirty="0" smtClean="0">
+                <a:latin typeface="微软雅黑" panose="020B0503020204020204" pitchFamily="34" charset="-122"/>
+                <a:ea typeface="微软雅黑" panose="020B0503020204020204" pitchFamily="34" charset="-122"/>
+              </a:rPr>
+              <a:t>如果数据页不存在于</a:t>
+            </a:r>
+            <a:r>
+              <a:rPr lang="en-US" altLang="zh-CN" sz="1000" dirty="0" smtClean="0">
+                <a:latin typeface="微软雅黑" panose="020B0503020204020204" pitchFamily="34" charset="-122"/>
+                <a:ea typeface="微软雅黑" panose="020B0503020204020204" pitchFamily="34" charset="-122"/>
+              </a:rPr>
+              <a:t>buffer pool</a:t>
+            </a:r>
+            <a:r>
+              <a:rPr lang="zh-CN" altLang="en-US" sz="1000" dirty="0" smtClean="0">
+                <a:latin typeface="微软雅黑" panose="020B0503020204020204" pitchFamily="34" charset="-122"/>
+                <a:ea typeface="微软雅黑" panose="020B0503020204020204" pitchFamily="34" charset="-122"/>
+              </a:rPr>
+              <a:t>，则先把操作描述</a:t>
+            </a:r>
+            <a:r>
+              <a:rPr lang="zh-CN" altLang="en-US" sz="1000" dirty="0" smtClean="0">
+                <a:latin typeface="微软雅黑" panose="020B0503020204020204" pitchFamily="34" charset="-122"/>
+                <a:ea typeface="微软雅黑" panose="020B0503020204020204" pitchFamily="34" charset="-122"/>
+              </a:rPr>
+              <a:t>放入</a:t>
+            </a:r>
+            <a:r>
+              <a:rPr lang="en-US" altLang="zh-CN" sz="1000" dirty="0" smtClean="0">
+                <a:latin typeface="微软雅黑" panose="020B0503020204020204" pitchFamily="34" charset="-122"/>
+                <a:ea typeface="微软雅黑" panose="020B0503020204020204" pitchFamily="34" charset="-122"/>
+              </a:rPr>
+              <a:t>change buffer</a:t>
+            </a:r>
+            <a:endParaRPr lang="zh-CN" altLang="en-US" sz="1000" dirty="0">
               <a:latin typeface="微软雅黑" panose="020B0503020204020204" pitchFamily="34" charset="-122"/>
               <a:ea typeface="微软雅黑" panose="020B0503020204020204" pitchFamily="34" charset="-122"/>
             </a:endParaRPr>
@@ -9450,7 +9441,7 @@
         <p:spPr>
           <a:xfrm>
             <a:off x="8509350" y="2674460"/>
-            <a:ext cx="2844800" cy="2126140"/>
+            <a:ext cx="2844800" cy="3967742"/>
           </a:xfrm>
           <a:prstGeom prst="flowChartMagneticDisk">
             <a:avLst/>
@@ -9737,13 +9728,13 @@
         </p:nvSpPr>
         <p:spPr>
           <a:xfrm>
-            <a:off x="8280575" y="5107678"/>
+            <a:off x="9159980" y="1442221"/>
             <a:ext cx="2330241" cy="797821"/>
           </a:xfrm>
           <a:prstGeom prst="wedgeRectCallout">
             <a:avLst>
-              <a:gd name="adj1" fmla="val -90995"/>
-              <a:gd name="adj2" fmla="val -212130"/>
+              <a:gd name="adj1" fmla="val -132433"/>
+              <a:gd name="adj2" fmla="val 216061"/>
             </a:avLst>
           </a:prstGeom>
           <a:solidFill>
@@ -9824,13 +9815,13 @@
         </p:nvSpPr>
         <p:spPr>
           <a:xfrm>
-            <a:off x="2324450" y="5837756"/>
+            <a:off x="5590078" y="2207607"/>
             <a:ext cx="2330241" cy="905944"/>
           </a:xfrm>
           <a:prstGeom prst="wedgeRectCallout">
             <a:avLst>
-              <a:gd name="adj1" fmla="val -20417"/>
-              <a:gd name="adj2" fmla="val -188653"/>
+              <a:gd name="adj1" fmla="val -90108"/>
+              <a:gd name="adj2" fmla="val 46320"/>
             </a:avLst>
           </a:prstGeom>
           <a:solidFill>
@@ -10129,8 +10120,8 @@
         </p:nvSpPr>
         <p:spPr>
           <a:xfrm>
-            <a:off x="4553125" y="4751338"/>
-            <a:ext cx="730754" cy="338554"/>
+            <a:off x="1973337" y="4526280"/>
+            <a:ext cx="1618426" cy="338554"/>
           </a:xfrm>
           <a:prstGeom prst="rect">
             <a:avLst/>
@@ -10143,13 +10134,263 @@
           <a:lstStyle/>
           <a:p>
             <a:r>
-              <a:rPr lang="zh-CN" altLang="en-US" sz="1600" dirty="0" smtClean="0">
-                <a:latin typeface="微软雅黑" panose="020B0503020204020204" pitchFamily="34" charset="-122"/>
-                <a:ea typeface="微软雅黑" panose="020B0503020204020204" pitchFamily="34" charset="-122"/>
-              </a:rPr>
-              <a:t>内存</a:t>
+              <a:rPr lang="en-US" altLang="zh-CN" sz="1600" dirty="0" smtClean="0">
+                <a:latin typeface="微软雅黑" panose="020B0503020204020204" pitchFamily="34" charset="-122"/>
+                <a:ea typeface="微软雅黑" panose="020B0503020204020204" pitchFamily="34" charset="-122"/>
+              </a:rPr>
+              <a:t>buffer pool</a:t>
             </a:r>
             <a:endParaRPr lang="zh-CN" altLang="en-US" sz="1600" dirty="0">
+              <a:latin typeface="微软雅黑" panose="020B0503020204020204" pitchFamily="34" charset="-122"/>
+              <a:ea typeface="微软雅黑" panose="020B0503020204020204" pitchFamily="34" charset="-122"/>
+            </a:endParaRPr>
+          </a:p>
+        </p:txBody>
+      </p:sp>
+      <p:sp>
+        <p:nvSpPr>
+          <p:cNvPr id="27" name="流程图: 文档 26"/>
+          <p:cNvSpPr/>
+          <p:nvPr/>
+        </p:nvSpPr>
+        <p:spPr>
+          <a:xfrm>
+            <a:off x="2956744" y="5472769"/>
+            <a:ext cx="1306285" cy="662994"/>
+          </a:xfrm>
+          <a:prstGeom prst="flowChartDocument">
+            <a:avLst/>
+          </a:prstGeom>
+          <a:ln/>
+        </p:spPr>
+        <p:style>
+          <a:lnRef idx="1">
+            <a:schemeClr val="accent6"/>
+          </a:lnRef>
+          <a:fillRef idx="3">
+            <a:schemeClr val="accent6"/>
+          </a:fillRef>
+          <a:effectRef idx="2">
+            <a:schemeClr val="accent6"/>
+          </a:effectRef>
+          <a:fontRef idx="minor">
+            <a:schemeClr val="lt1"/>
+          </a:fontRef>
+        </p:style>
+        <p:txBody>
+          <a:bodyPr rtlCol="0" anchor="ctr"/>
+          <a:lstStyle/>
+          <a:p>
+            <a:pPr algn="ctr"/>
+            <a:r>
+              <a:rPr lang="zh-CN" altLang="en-US" sz="1200" dirty="0">
+                <a:latin typeface="微软雅黑" panose="020B0503020204020204" pitchFamily="34" charset="-122"/>
+                <a:ea typeface="微软雅黑" panose="020B0503020204020204" pitchFamily="34" charset="-122"/>
+              </a:rPr>
+              <a:t>二级索引的叶子数据页</a:t>
+            </a:r>
+          </a:p>
+        </p:txBody>
+      </p:sp>
+      <p:sp>
+        <p:nvSpPr>
+          <p:cNvPr id="28" name="流程图: 文档 27"/>
+          <p:cNvSpPr/>
+          <p:nvPr/>
+        </p:nvSpPr>
+        <p:spPr>
+          <a:xfrm>
+            <a:off x="9278257" y="5472769"/>
+            <a:ext cx="1306285" cy="662994"/>
+          </a:xfrm>
+          <a:prstGeom prst="flowChartDocument">
+            <a:avLst/>
+          </a:prstGeom>
+          <a:ln/>
+        </p:spPr>
+        <p:style>
+          <a:lnRef idx="1">
+            <a:schemeClr val="accent6"/>
+          </a:lnRef>
+          <a:fillRef idx="3">
+            <a:schemeClr val="accent6"/>
+          </a:fillRef>
+          <a:effectRef idx="2">
+            <a:schemeClr val="accent6"/>
+          </a:effectRef>
+          <a:fontRef idx="minor">
+            <a:schemeClr val="lt1"/>
+          </a:fontRef>
+        </p:style>
+        <p:txBody>
+          <a:bodyPr rtlCol="0" anchor="ctr"/>
+          <a:lstStyle/>
+          <a:p>
+            <a:pPr algn="ctr"/>
+            <a:r>
+              <a:rPr lang="zh-CN" altLang="en-US" sz="1200" dirty="0">
+                <a:latin typeface="微软雅黑" panose="020B0503020204020204" pitchFamily="34" charset="-122"/>
+                <a:ea typeface="微软雅黑" panose="020B0503020204020204" pitchFamily="34" charset="-122"/>
+              </a:rPr>
+              <a:t>二级索引的叶子数据页</a:t>
+            </a:r>
+          </a:p>
+        </p:txBody>
+      </p:sp>
+      <p:cxnSp>
+        <p:nvCxnSpPr>
+          <p:cNvPr id="29" name="肘形连接符 28"/>
+          <p:cNvCxnSpPr>
+            <a:stCxn id="27" idx="3"/>
+            <a:endCxn id="28" idx="1"/>
+          </p:cNvCxnSpPr>
+          <p:nvPr/>
+        </p:nvCxnSpPr>
+        <p:spPr>
+          <a:xfrm>
+            <a:off x="4263029" y="5804266"/>
+            <a:ext cx="5015228" cy="12700"/>
+          </a:xfrm>
+          <a:prstGeom prst="bentConnector3">
+            <a:avLst>
+              <a:gd name="adj1" fmla="val 50000"/>
+            </a:avLst>
+          </a:prstGeom>
+          <a:ln>
+            <a:tailEnd type="triangle"/>
+          </a:ln>
+        </p:spPr>
+        <p:style>
+          <a:lnRef idx="1">
+            <a:schemeClr val="accent3"/>
+          </a:lnRef>
+          <a:fillRef idx="0">
+            <a:schemeClr val="accent3"/>
+          </a:fillRef>
+          <a:effectRef idx="0">
+            <a:schemeClr val="accent3"/>
+          </a:effectRef>
+          <a:fontRef idx="minor">
+            <a:schemeClr val="tx1"/>
+          </a:fontRef>
+        </p:style>
+      </p:cxnSp>
+      <p:cxnSp>
+        <p:nvCxnSpPr>
+          <p:cNvPr id="32" name="直接箭头连接符 31"/>
+          <p:cNvCxnSpPr>
+            <a:stCxn id="6" idx="4"/>
+            <a:endCxn id="27" idx="1"/>
+          </p:cNvCxnSpPr>
+          <p:nvPr/>
+        </p:nvCxnSpPr>
+        <p:spPr>
+          <a:xfrm>
+            <a:off x="546100" y="3911600"/>
+            <a:ext cx="2410644" cy="1892666"/>
+          </a:xfrm>
+          <a:prstGeom prst="straightConnector1">
+            <a:avLst/>
+          </a:prstGeom>
+          <a:ln>
+            <a:tailEnd type="triangle"/>
+          </a:ln>
+        </p:spPr>
+        <p:style>
+          <a:lnRef idx="1">
+            <a:schemeClr val="accent3"/>
+          </a:lnRef>
+          <a:fillRef idx="0">
+            <a:schemeClr val="accent3"/>
+          </a:fillRef>
+          <a:effectRef idx="0">
+            <a:schemeClr val="accent3"/>
+          </a:effectRef>
+          <a:fontRef idx="minor">
+            <a:schemeClr val="tx1"/>
+          </a:fontRef>
+        </p:style>
+      </p:cxnSp>
+      <p:sp>
+        <p:nvSpPr>
+          <p:cNvPr id="35" name="文本框 34"/>
+          <p:cNvSpPr txBox="1"/>
+          <p:nvPr/>
+        </p:nvSpPr>
+        <p:spPr>
+          <a:xfrm>
+            <a:off x="621753" y="4516242"/>
+            <a:ext cx="1305864" cy="553998"/>
+          </a:xfrm>
+          <a:prstGeom prst="rect">
+            <a:avLst/>
+          </a:prstGeom>
+          <a:noFill/>
+        </p:spPr>
+        <p:txBody>
+          <a:bodyPr wrap="square" rtlCol="0">
+            <a:spAutoFit/>
+          </a:bodyPr>
+          <a:lstStyle/>
+          <a:p>
+            <a:r>
+              <a:rPr lang="zh-CN" altLang="en-US" sz="1000" dirty="0" smtClean="0">
+                <a:latin typeface="微软雅黑" panose="020B0503020204020204" pitchFamily="34" charset="-122"/>
+                <a:ea typeface="微软雅黑" panose="020B0503020204020204" pitchFamily="34" charset="-122"/>
+              </a:rPr>
+              <a:t>如果数据页存在于</a:t>
+            </a:r>
+            <a:r>
+              <a:rPr lang="en-US" altLang="zh-CN" sz="1000" dirty="0" smtClean="0">
+                <a:latin typeface="微软雅黑" panose="020B0503020204020204" pitchFamily="34" charset="-122"/>
+                <a:ea typeface="微软雅黑" panose="020B0503020204020204" pitchFamily="34" charset="-122"/>
+              </a:rPr>
+              <a:t>buffer pool</a:t>
+            </a:r>
+            <a:r>
+              <a:rPr lang="zh-CN" altLang="en-US" sz="1000" dirty="0" smtClean="0">
+                <a:latin typeface="微软雅黑" panose="020B0503020204020204" pitchFamily="34" charset="-122"/>
+                <a:ea typeface="微软雅黑" panose="020B0503020204020204" pitchFamily="34" charset="-122"/>
+              </a:rPr>
+              <a:t>，则直接更新内存即可。</a:t>
+            </a:r>
+            <a:endParaRPr lang="zh-CN" altLang="en-US" sz="1000" dirty="0">
+              <a:latin typeface="微软雅黑" panose="020B0503020204020204" pitchFamily="34" charset="-122"/>
+              <a:ea typeface="微软雅黑" panose="020B0503020204020204" pitchFamily="34" charset="-122"/>
+            </a:endParaRPr>
+          </a:p>
+        </p:txBody>
+      </p:sp>
+      <p:sp>
+        <p:nvSpPr>
+          <p:cNvPr id="36" name="文本框 35"/>
+          <p:cNvSpPr txBox="1"/>
+          <p:nvPr/>
+        </p:nvSpPr>
+        <p:spPr>
+          <a:xfrm>
+            <a:off x="5531132" y="5472769"/>
+            <a:ext cx="684803" cy="292388"/>
+          </a:xfrm>
+          <a:prstGeom prst="rect">
+            <a:avLst/>
+          </a:prstGeom>
+          <a:noFill/>
+        </p:spPr>
+        <p:txBody>
+          <a:bodyPr wrap="none" rtlCol="0">
+            <a:spAutoFit/>
+          </a:bodyPr>
+          <a:lstStyle/>
+          <a:p>
+            <a:r>
+              <a:rPr lang="zh-CN" altLang="en-US" sz="1300" dirty="0" smtClean="0">
+                <a:latin typeface="微软雅黑" panose="020B0503020204020204" pitchFamily="34" charset="-122"/>
+                <a:ea typeface="微软雅黑" panose="020B0503020204020204" pitchFamily="34" charset="-122"/>
+              </a:rPr>
+              <a:t>刷脏页</a:t>
+            </a:r>
+            <a:endParaRPr lang="zh-CN" altLang="en-US" sz="1300" dirty="0">
               <a:latin typeface="微软雅黑" panose="020B0503020204020204" pitchFamily="34" charset="-122"/>
               <a:ea typeface="微软雅黑" panose="020B0503020204020204" pitchFamily="34" charset="-122"/>
             </a:endParaRPr>
@@ -10629,7 +10870,7 @@
         <p:spPr>
           <a:xfrm>
             <a:off x="2810329" y="3986016"/>
-            <a:ext cx="2546525" cy="1909623"/>
+            <a:ext cx="3415421" cy="1909623"/>
           </a:xfrm>
           <a:prstGeom prst="roundRect">
             <a:avLst/>
@@ -11153,7 +11394,7 @@
         <p:spPr>
           <a:xfrm>
             <a:off x="4789936" y="4748914"/>
-            <a:ext cx="730754" cy="338554"/>
+            <a:ext cx="1658572" cy="338554"/>
           </a:xfrm>
           <a:prstGeom prst="rect">
             <a:avLst/>
@@ -11166,11 +11407,11 @@
           <a:lstStyle/>
           <a:p>
             <a:r>
-              <a:rPr lang="zh-CN" altLang="en-US" sz="1600" dirty="0" smtClean="0">
-                <a:latin typeface="微软雅黑" panose="020B0503020204020204" pitchFamily="34" charset="-122"/>
-                <a:ea typeface="微软雅黑" panose="020B0503020204020204" pitchFamily="34" charset="-122"/>
-              </a:rPr>
-              <a:t>内存</a:t>
+              <a:rPr lang="en-US" altLang="zh-CN" sz="1600" dirty="0" smtClean="0">
+                <a:latin typeface="微软雅黑" panose="020B0503020204020204" pitchFamily="34" charset="-122"/>
+                <a:ea typeface="微软雅黑" panose="020B0503020204020204" pitchFamily="34" charset="-122"/>
+              </a:rPr>
+              <a:t>buffer pool</a:t>
             </a:r>
             <a:endParaRPr lang="zh-CN" altLang="en-US" sz="1600" dirty="0">
               <a:latin typeface="微软雅黑" panose="020B0503020204020204" pitchFamily="34" charset="-122"/>
@@ -11225,7 +11466,7 @@
         <p:spPr>
           <a:xfrm>
             <a:off x="2634146" y="2251710"/>
-            <a:ext cx="2961283" cy="4171950"/>
+            <a:ext cx="3544017" cy="4171950"/>
           </a:xfrm>
           <a:prstGeom prst="roundRect">
             <a:avLst/>
@@ -11469,7 +11710,7 @@
         <p:spPr>
           <a:xfrm>
             <a:off x="2956204" y="4141035"/>
-            <a:ext cx="2381425" cy="584775"/>
+            <a:ext cx="2381425" cy="338554"/>
           </a:xfrm>
           <a:prstGeom prst="rect">
             <a:avLst/>
@@ -11482,41 +11723,11 @@
           <a:lstStyle/>
           <a:p>
             <a:r>
-              <a:rPr lang="zh-CN" altLang="en-US" sz="1600" dirty="0" smtClean="0">
-                <a:latin typeface="微软雅黑" panose="020B0503020204020204" pitchFamily="34" charset="-122"/>
-                <a:ea typeface="微软雅黑" panose="020B0503020204020204" pitchFamily="34" charset="-122"/>
-              </a:rPr>
-              <a:t>内存中的</a:t>
-            </a:r>
-            <a:r>
               <a:rPr lang="en-US" altLang="zh-CN" sz="1600" dirty="0" smtClean="0">
                 <a:latin typeface="微软雅黑" panose="020B0503020204020204" pitchFamily="34" charset="-122"/>
                 <a:ea typeface="微软雅黑" panose="020B0503020204020204" pitchFamily="34" charset="-122"/>
               </a:rPr>
               <a:t>change buffer</a:t>
-            </a:r>
-          </a:p>
-          <a:p>
-            <a:r>
-              <a:rPr lang="zh-CN" altLang="en-US" sz="1600" dirty="0" smtClean="0">
-                <a:latin typeface="微软雅黑" panose="020B0503020204020204" pitchFamily="34" charset="-122"/>
-                <a:ea typeface="微软雅黑" panose="020B0503020204020204" pitchFamily="34" charset="-122"/>
-              </a:rPr>
-              <a:t>被</a:t>
-            </a:r>
-            <a:r>
-              <a:rPr lang="en-US" altLang="zh-CN" sz="1600" dirty="0" smtClean="0">
-                <a:latin typeface="微软雅黑" panose="020B0503020204020204" pitchFamily="34" charset="-122"/>
-                <a:ea typeface="微软雅黑" panose="020B0503020204020204" pitchFamily="34" charset="-122"/>
-              </a:rPr>
-              <a:t>buffer pool</a:t>
-            </a:r>
-            <a:r>
-              <a:rPr lang="zh-CN" altLang="en-US" sz="1600" dirty="0" smtClean="0">
-                <a:latin typeface="微软雅黑" panose="020B0503020204020204" pitchFamily="34" charset="-122"/>
-                <a:ea typeface="微软雅黑" panose="020B0503020204020204" pitchFamily="34" charset="-122"/>
-              </a:rPr>
-              <a:t>管理</a:t>
             </a:r>
             <a:endParaRPr lang="zh-CN" altLang="en-US" sz="1600" dirty="0">
               <a:latin typeface="微软雅黑" panose="020B0503020204020204" pitchFamily="34" charset="-122"/>
@@ -11899,7 +12110,7 @@
         </p:nvSpPr>
         <p:spPr>
           <a:xfrm>
-            <a:off x="5885399" y="5626801"/>
+            <a:off x="6401646" y="5610872"/>
             <a:ext cx="2532296" cy="292388"/>
           </a:xfrm>
           <a:prstGeom prst="rect">
@@ -12775,7 +12986,7 @@
         <p:spPr>
           <a:xfrm>
             <a:off x="4791427" y="2596056"/>
-            <a:ext cx="1043784" cy="338554"/>
+            <a:ext cx="1386736" cy="338554"/>
           </a:xfrm>
           <a:prstGeom prst="rect">
             <a:avLst/>
@@ -12788,13 +12999,86 @@
           <a:lstStyle/>
           <a:p>
             <a:r>
-              <a:rPr lang="zh-CN" altLang="en-US" sz="1600" dirty="0" smtClean="0">
-                <a:latin typeface="微软雅黑" panose="020B0503020204020204" pitchFamily="34" charset="-122"/>
-                <a:ea typeface="微软雅黑" panose="020B0503020204020204" pitchFamily="34" charset="-122"/>
-              </a:rPr>
-              <a:t>内存</a:t>
+              <a:rPr lang="en-US" altLang="zh-CN" sz="1600" dirty="0" smtClean="0">
+                <a:latin typeface="微软雅黑" panose="020B0503020204020204" pitchFamily="34" charset="-122"/>
+                <a:ea typeface="微软雅黑" panose="020B0503020204020204" pitchFamily="34" charset="-122"/>
+              </a:rPr>
+              <a:t>buffer pool</a:t>
             </a:r>
             <a:endParaRPr lang="zh-CN" altLang="en-US" sz="1600" dirty="0">
+              <a:latin typeface="微软雅黑" panose="020B0503020204020204" pitchFamily="34" charset="-122"/>
+              <a:ea typeface="微软雅黑" panose="020B0503020204020204" pitchFamily="34" charset="-122"/>
+            </a:endParaRPr>
+          </a:p>
+        </p:txBody>
+      </p:sp>
+      <p:cxnSp>
+        <p:nvCxnSpPr>
+          <p:cNvPr id="31" name="直接箭头连接符 36"/>
+          <p:cNvCxnSpPr>
+            <a:stCxn id="39" idx="3"/>
+          </p:cNvCxnSpPr>
+          <p:nvPr/>
+        </p:nvCxnSpPr>
+        <p:spPr>
+          <a:xfrm>
+            <a:off x="4714221" y="2849334"/>
+            <a:ext cx="5101065" cy="2949121"/>
+          </a:xfrm>
+          <a:prstGeom prst="bentConnector3">
+            <a:avLst>
+              <a:gd name="adj1" fmla="val 82422"/>
+            </a:avLst>
+          </a:prstGeom>
+          <a:ln>
+            <a:tailEnd type="triangle"/>
+          </a:ln>
+        </p:spPr>
+        <p:style>
+          <a:lnRef idx="1">
+            <a:schemeClr val="accent3"/>
+          </a:lnRef>
+          <a:fillRef idx="0">
+            <a:schemeClr val="accent3"/>
+          </a:fillRef>
+          <a:effectRef idx="0">
+            <a:schemeClr val="accent3"/>
+          </a:effectRef>
+          <a:fontRef idx="minor">
+            <a:schemeClr val="tx1"/>
+          </a:fontRef>
+        </p:style>
+      </p:cxnSp>
+      <p:sp>
+        <p:nvSpPr>
+          <p:cNvPr id="35" name="文本框 34"/>
+          <p:cNvSpPr txBox="1"/>
+          <p:nvPr/>
+        </p:nvSpPr>
+        <p:spPr>
+          <a:xfrm>
+            <a:off x="6730576" y="2517837"/>
+            <a:ext cx="684803" cy="292388"/>
+          </a:xfrm>
+          <a:prstGeom prst="rect">
+            <a:avLst/>
+          </a:prstGeom>
+          <a:noFill/>
+        </p:spPr>
+        <p:txBody>
+          <a:bodyPr wrap="none" rtlCol="0">
+            <a:spAutoFit/>
+          </a:bodyPr>
+          <a:lstStyle/>
+          <a:p>
+            <a:r>
+              <a:rPr lang="zh-CN" altLang="en-US" sz="1300" dirty="0" smtClean="0">
+                <a:latin typeface="微软雅黑" panose="020B0503020204020204" pitchFamily="34" charset="-122"/>
+                <a:ea typeface="微软雅黑" panose="020B0503020204020204" pitchFamily="34" charset="-122"/>
+              </a:rPr>
+              <a:t>刷脏页</a:t>
+            </a:r>
+            <a:endParaRPr lang="zh-CN" altLang="en-US" sz="1300" dirty="0">
               <a:latin typeface="微软雅黑" panose="020B0503020204020204" pitchFamily="34" charset="-122"/>
               <a:ea typeface="微软雅黑" panose="020B0503020204020204" pitchFamily="34" charset="-122"/>
             </a:endParaRPr>
@@ -12847,7 +13131,7 @@
         <p:spPr>
           <a:xfrm>
             <a:off x="2634146" y="2251710"/>
-            <a:ext cx="2961283" cy="4171950"/>
+            <a:ext cx="3515934" cy="4171950"/>
           </a:xfrm>
           <a:prstGeom prst="roundRect">
             <a:avLst/>
@@ -13102,7 +13386,7 @@
         <p:spPr>
           <a:xfrm>
             <a:off x="2956204" y="4141035"/>
-            <a:ext cx="2381425" cy="584775"/>
+            <a:ext cx="2381425" cy="338554"/>
           </a:xfrm>
           <a:prstGeom prst="rect">
             <a:avLst/>
@@ -13115,41 +13399,11 @@
           <a:lstStyle/>
           <a:p>
             <a:r>
-              <a:rPr lang="zh-CN" altLang="en-US" sz="1600" dirty="0" smtClean="0">
-                <a:latin typeface="微软雅黑" panose="020B0503020204020204" pitchFamily="34" charset="-122"/>
-                <a:ea typeface="微软雅黑" panose="020B0503020204020204" pitchFamily="34" charset="-122"/>
-              </a:rPr>
-              <a:t>内存中的</a:t>
-            </a:r>
-            <a:r>
               <a:rPr lang="en-US" altLang="zh-CN" sz="1600" dirty="0" smtClean="0">
                 <a:latin typeface="微软雅黑" panose="020B0503020204020204" pitchFamily="34" charset="-122"/>
                 <a:ea typeface="微软雅黑" panose="020B0503020204020204" pitchFamily="34" charset="-122"/>
               </a:rPr>
               <a:t>change buffer</a:t>
-            </a:r>
-          </a:p>
-          <a:p>
-            <a:r>
-              <a:rPr lang="zh-CN" altLang="en-US" sz="1600" dirty="0" smtClean="0">
-                <a:latin typeface="微软雅黑" panose="020B0503020204020204" pitchFamily="34" charset="-122"/>
-                <a:ea typeface="微软雅黑" panose="020B0503020204020204" pitchFamily="34" charset="-122"/>
-              </a:rPr>
-              <a:t>被</a:t>
-            </a:r>
-            <a:r>
-              <a:rPr lang="en-US" altLang="zh-CN" sz="1600" dirty="0" smtClean="0">
-                <a:latin typeface="微软雅黑" panose="020B0503020204020204" pitchFamily="34" charset="-122"/>
-                <a:ea typeface="微软雅黑" panose="020B0503020204020204" pitchFamily="34" charset="-122"/>
-              </a:rPr>
-              <a:t>buffer pool</a:t>
-            </a:r>
-            <a:r>
-              <a:rPr lang="zh-CN" altLang="en-US" sz="1600" dirty="0" smtClean="0">
-                <a:latin typeface="微软雅黑" panose="020B0503020204020204" pitchFamily="34" charset="-122"/>
-                <a:ea typeface="微软雅黑" panose="020B0503020204020204" pitchFamily="34" charset="-122"/>
-              </a:rPr>
-              <a:t>管理</a:t>
             </a:r>
             <a:endParaRPr lang="zh-CN" altLang="en-US" sz="1600" dirty="0">
               <a:latin typeface="微软雅黑" panose="020B0503020204020204" pitchFamily="34" charset="-122"/>
@@ -14320,7 +14574,14 @@
                 <a:latin typeface="微软雅黑" panose="020B0503020204020204" pitchFamily="34" charset="-122"/>
                 <a:ea typeface="微软雅黑" panose="020B0503020204020204" pitchFamily="34" charset="-122"/>
               </a:rPr>
-              <a:t>适合写完马上被访问的概率小的场景</a:t>
+              <a:t>适合写完马上被访问的概率小的</a:t>
+            </a:r>
+            <a:r>
+              <a:rPr lang="zh-CN" altLang="en-US" sz="1400" dirty="0" smtClean="0">
+                <a:latin typeface="微软雅黑" panose="020B0503020204020204" pitchFamily="34" charset="-122"/>
+                <a:ea typeface="微软雅黑" panose="020B0503020204020204" pitchFamily="34" charset="-122"/>
+              </a:rPr>
+              <a:t>场景（写日志）</a:t>
             </a:r>
             <a:endParaRPr lang="en-US" altLang="zh-CN" sz="1400" dirty="0">
               <a:latin typeface="微软雅黑" panose="020B0503020204020204" pitchFamily="34" charset="-122"/>
@@ -14427,8 +14688,8 @@
         </p:nvSpPr>
         <p:spPr>
           <a:xfrm>
-            <a:off x="4687545" y="2659832"/>
-            <a:ext cx="730754" cy="338554"/>
+            <a:off x="4682866" y="2438275"/>
+            <a:ext cx="1498570" cy="338554"/>
           </a:xfrm>
           <a:prstGeom prst="rect">
             <a:avLst/>
@@ -14441,13 +14702,84 @@
           <a:lstStyle/>
           <a:p>
             <a:r>
-              <a:rPr lang="zh-CN" altLang="en-US" sz="1600" dirty="0" smtClean="0">
-                <a:latin typeface="微软雅黑" panose="020B0503020204020204" pitchFamily="34" charset="-122"/>
-                <a:ea typeface="微软雅黑" panose="020B0503020204020204" pitchFamily="34" charset="-122"/>
-              </a:rPr>
-              <a:t>内存</a:t>
+              <a:rPr lang="en-US" altLang="zh-CN" sz="1600" dirty="0" smtClean="0">
+                <a:latin typeface="微软雅黑" panose="020B0503020204020204" pitchFamily="34" charset="-122"/>
+                <a:ea typeface="微软雅黑" panose="020B0503020204020204" pitchFamily="34" charset="-122"/>
+              </a:rPr>
+              <a:t>buffer pool</a:t>
             </a:r>
             <a:endParaRPr lang="zh-CN" altLang="en-US" sz="1600" dirty="0">
+              <a:latin typeface="微软雅黑" panose="020B0503020204020204" pitchFamily="34" charset="-122"/>
+              <a:ea typeface="微软雅黑" panose="020B0503020204020204" pitchFamily="34" charset="-122"/>
+            </a:endParaRPr>
+          </a:p>
+        </p:txBody>
+      </p:sp>
+      <p:cxnSp>
+        <p:nvCxnSpPr>
+          <p:cNvPr id="32" name="直接箭头连接符 36"/>
+          <p:cNvCxnSpPr/>
+          <p:nvPr/>
+        </p:nvCxnSpPr>
+        <p:spPr>
+          <a:xfrm>
+            <a:off x="4714221" y="2849334"/>
+            <a:ext cx="5101065" cy="2949121"/>
+          </a:xfrm>
+          <a:prstGeom prst="bentConnector3">
+            <a:avLst>
+              <a:gd name="adj1" fmla="val 82422"/>
+            </a:avLst>
+          </a:prstGeom>
+          <a:ln>
+            <a:tailEnd type="triangle"/>
+          </a:ln>
+        </p:spPr>
+        <p:style>
+          <a:lnRef idx="1">
+            <a:schemeClr val="accent3"/>
+          </a:lnRef>
+          <a:fillRef idx="0">
+            <a:schemeClr val="accent3"/>
+          </a:fillRef>
+          <a:effectRef idx="0">
+            <a:schemeClr val="accent3"/>
+          </a:effectRef>
+          <a:fontRef idx="minor">
+            <a:schemeClr val="tx1"/>
+          </a:fontRef>
+        </p:style>
+      </p:cxnSp>
+      <p:sp>
+        <p:nvSpPr>
+          <p:cNvPr id="33" name="文本框 32"/>
+          <p:cNvSpPr txBox="1"/>
+          <p:nvPr/>
+        </p:nvSpPr>
+        <p:spPr>
+          <a:xfrm>
+            <a:off x="6730576" y="2517837"/>
+            <a:ext cx="684803" cy="292388"/>
+          </a:xfrm>
+          <a:prstGeom prst="rect">
+            <a:avLst/>
+          </a:prstGeom>
+          <a:noFill/>
+        </p:spPr>
+        <p:txBody>
+          <a:bodyPr wrap="none" rtlCol="0">
+            <a:spAutoFit/>
+          </a:bodyPr>
+          <a:lstStyle/>
+          <a:p>
+            <a:r>
+              <a:rPr lang="zh-CN" altLang="en-US" sz="1300" dirty="0" smtClean="0">
+                <a:latin typeface="微软雅黑" panose="020B0503020204020204" pitchFamily="34" charset="-122"/>
+                <a:ea typeface="微软雅黑" panose="020B0503020204020204" pitchFamily="34" charset="-122"/>
+              </a:rPr>
+              <a:t>刷脏页</a:t>
+            </a:r>
+            <a:endParaRPr lang="zh-CN" altLang="en-US" sz="1300" dirty="0">
               <a:latin typeface="微软雅黑" panose="020B0503020204020204" pitchFamily="34" charset="-122"/>
               <a:ea typeface="微软雅黑" panose="020B0503020204020204" pitchFamily="34" charset="-122"/>
             </a:endParaRPr>
@@ -15004,7 +15336,7 @@
         <p:spPr>
           <a:xfrm>
             <a:off x="1820705" y="3024504"/>
-            <a:ext cx="2381425" cy="584775"/>
+            <a:ext cx="2381425" cy="338554"/>
           </a:xfrm>
           <a:prstGeom prst="rect">
             <a:avLst/>
@@ -15017,41 +15349,11 @@
           <a:lstStyle/>
           <a:p>
             <a:r>
-              <a:rPr lang="zh-CN" altLang="en-US" sz="1600" dirty="0" smtClean="0">
-                <a:latin typeface="微软雅黑" panose="020B0503020204020204" pitchFamily="34" charset="-122"/>
-                <a:ea typeface="微软雅黑" panose="020B0503020204020204" pitchFamily="34" charset="-122"/>
-              </a:rPr>
-              <a:t>内存中的</a:t>
-            </a:r>
-            <a:r>
               <a:rPr lang="en-US" altLang="zh-CN" sz="1600" dirty="0" smtClean="0">
                 <a:latin typeface="微软雅黑" panose="020B0503020204020204" pitchFamily="34" charset="-122"/>
                 <a:ea typeface="微软雅黑" panose="020B0503020204020204" pitchFamily="34" charset="-122"/>
               </a:rPr>
               <a:t>change buffer</a:t>
-            </a:r>
-          </a:p>
-          <a:p>
-            <a:r>
-              <a:rPr lang="zh-CN" altLang="en-US" sz="1600" dirty="0" smtClean="0">
-                <a:latin typeface="微软雅黑" panose="020B0503020204020204" pitchFamily="34" charset="-122"/>
-                <a:ea typeface="微软雅黑" panose="020B0503020204020204" pitchFamily="34" charset="-122"/>
-              </a:rPr>
-              <a:t>被</a:t>
-            </a:r>
-            <a:r>
-              <a:rPr lang="en-US" altLang="zh-CN" sz="1600" dirty="0" smtClean="0">
-                <a:latin typeface="微软雅黑" panose="020B0503020204020204" pitchFamily="34" charset="-122"/>
-                <a:ea typeface="微软雅黑" panose="020B0503020204020204" pitchFamily="34" charset="-122"/>
-              </a:rPr>
-              <a:t>buffer pool</a:t>
-            </a:r>
-            <a:r>
-              <a:rPr lang="zh-CN" altLang="en-US" sz="1600" dirty="0" smtClean="0">
-                <a:latin typeface="微软雅黑" panose="020B0503020204020204" pitchFamily="34" charset="-122"/>
-                <a:ea typeface="微软雅黑" panose="020B0503020204020204" pitchFamily="34" charset="-122"/>
-              </a:rPr>
-              <a:t>管理</a:t>
             </a:r>
             <a:endParaRPr lang="zh-CN" altLang="en-US" sz="1600" dirty="0">
               <a:latin typeface="微软雅黑" panose="020B0503020204020204" pitchFamily="34" charset="-122"/>

</xml_diff>